<commit_message>
feat: adicionar página "Sobre"
</commit_message>
<xml_diff>
--- a/Projeto Website para nutricionista e personal trainer/Projeto Website para nutricionista e personal trainer.pptx
+++ b/Projeto Website para nutricionista e personal trainer/Projeto Website para nutricionista e personal trainer.pptx
@@ -107,6 +107,11 @@
       </a:defRPr>
     </a:lvl9pPr>
   </p:defaultTextStyle>
+  <p:extLst>
+    <p:ext uri="{EFAFB233-063F-42B5-8137-9DF3F51BA10A}">
+      <p15:sldGuideLst xmlns:p15="http://schemas.microsoft.com/office/powerpoint/2012/main"/>
+    </p:ext>
+  </p:extLst>
 </p:presentation>
 </file>
 
@@ -241,7 +246,7 @@
           <a:p>
             <a:fld id="{520155FF-DFA8-4BB0-80DA-1AC3A7CFB1D9}" type="datetimeFigureOut">
               <a:rPr lang="pt-BR" smtClean="0"/>
-              <a:t>27/06/2024</a:t>
+              <a:t>01/07/2024</a:t>
             </a:fld>
             <a:endParaRPr lang="pt-BR"/>
           </a:p>
@@ -411,7 +416,7 @@
           <a:p>
             <a:fld id="{520155FF-DFA8-4BB0-80DA-1AC3A7CFB1D9}" type="datetimeFigureOut">
               <a:rPr lang="pt-BR" smtClean="0"/>
-              <a:t>27/06/2024</a:t>
+              <a:t>01/07/2024</a:t>
             </a:fld>
             <a:endParaRPr lang="pt-BR"/>
           </a:p>
@@ -591,7 +596,7 @@
           <a:p>
             <a:fld id="{520155FF-DFA8-4BB0-80DA-1AC3A7CFB1D9}" type="datetimeFigureOut">
               <a:rPr lang="pt-BR" smtClean="0"/>
-              <a:t>27/06/2024</a:t>
+              <a:t>01/07/2024</a:t>
             </a:fld>
             <a:endParaRPr lang="pt-BR"/>
           </a:p>
@@ -761,7 +766,7 @@
           <a:p>
             <a:fld id="{520155FF-DFA8-4BB0-80DA-1AC3A7CFB1D9}" type="datetimeFigureOut">
               <a:rPr lang="pt-BR" smtClean="0"/>
-              <a:t>27/06/2024</a:t>
+              <a:t>01/07/2024</a:t>
             </a:fld>
             <a:endParaRPr lang="pt-BR"/>
           </a:p>
@@ -1007,7 +1012,7 @@
           <a:p>
             <a:fld id="{520155FF-DFA8-4BB0-80DA-1AC3A7CFB1D9}" type="datetimeFigureOut">
               <a:rPr lang="pt-BR" smtClean="0"/>
-              <a:t>27/06/2024</a:t>
+              <a:t>01/07/2024</a:t>
             </a:fld>
             <a:endParaRPr lang="pt-BR"/>
           </a:p>
@@ -1239,7 +1244,7 @@
           <a:p>
             <a:fld id="{520155FF-DFA8-4BB0-80DA-1AC3A7CFB1D9}" type="datetimeFigureOut">
               <a:rPr lang="pt-BR" smtClean="0"/>
-              <a:t>27/06/2024</a:t>
+              <a:t>01/07/2024</a:t>
             </a:fld>
             <a:endParaRPr lang="pt-BR"/>
           </a:p>
@@ -1606,7 +1611,7 @@
           <a:p>
             <a:fld id="{520155FF-DFA8-4BB0-80DA-1AC3A7CFB1D9}" type="datetimeFigureOut">
               <a:rPr lang="pt-BR" smtClean="0"/>
-              <a:t>27/06/2024</a:t>
+              <a:t>01/07/2024</a:t>
             </a:fld>
             <a:endParaRPr lang="pt-BR"/>
           </a:p>
@@ -1724,7 +1729,7 @@
           <a:p>
             <a:fld id="{520155FF-DFA8-4BB0-80DA-1AC3A7CFB1D9}" type="datetimeFigureOut">
               <a:rPr lang="pt-BR" smtClean="0"/>
-              <a:t>27/06/2024</a:t>
+              <a:t>01/07/2024</a:t>
             </a:fld>
             <a:endParaRPr lang="pt-BR"/>
           </a:p>
@@ -1819,7 +1824,7 @@
           <a:p>
             <a:fld id="{520155FF-DFA8-4BB0-80DA-1AC3A7CFB1D9}" type="datetimeFigureOut">
               <a:rPr lang="pt-BR" smtClean="0"/>
-              <a:t>27/06/2024</a:t>
+              <a:t>01/07/2024</a:t>
             </a:fld>
             <a:endParaRPr lang="pt-BR"/>
           </a:p>
@@ -2096,7 +2101,7 @@
           <a:p>
             <a:fld id="{520155FF-DFA8-4BB0-80DA-1AC3A7CFB1D9}" type="datetimeFigureOut">
               <a:rPr lang="pt-BR" smtClean="0"/>
-              <a:t>27/06/2024</a:t>
+              <a:t>01/07/2024</a:t>
             </a:fld>
             <a:endParaRPr lang="pt-BR"/>
           </a:p>
@@ -2349,7 +2354,7 @@
           <a:p>
             <a:fld id="{520155FF-DFA8-4BB0-80DA-1AC3A7CFB1D9}" type="datetimeFigureOut">
               <a:rPr lang="pt-BR" smtClean="0"/>
-              <a:t>27/06/2024</a:t>
+              <a:t>01/07/2024</a:t>
             </a:fld>
             <a:endParaRPr lang="pt-BR"/>
           </a:p>
@@ -2562,7 +2567,7 @@
           <a:p>
             <a:fld id="{520155FF-DFA8-4BB0-80DA-1AC3A7CFB1D9}" type="datetimeFigureOut">
               <a:rPr lang="pt-BR" smtClean="0"/>
-              <a:t>27/06/2024</a:t>
+              <a:t>01/07/2024</a:t>
             </a:fld>
             <a:endParaRPr lang="pt-BR"/>
           </a:p>
@@ -3059,7 +3064,51 @@
           <a:lstStyle/>
           <a:p>
             <a:pPr algn="ctr"/>
-            <a:endParaRPr lang="pt-BR" dirty="0"/>
+            <a:r>
+              <a:rPr lang="en-US" sz="1200" dirty="0">
+                <a:solidFill>
+                  <a:schemeClr val="tx1"/>
+                </a:solidFill>
+              </a:rPr>
+              <a:t>© Copyright @ 2024 </a:t>
+            </a:r>
+            <a:r>
+              <a:rPr lang="en-US" sz="1200" dirty="0" err="1">
+                <a:solidFill>
+                  <a:schemeClr val="tx1"/>
+                </a:solidFill>
+              </a:rPr>
+              <a:t>NutriCoach</a:t>
+            </a:r>
+            <a:r>
+              <a:rPr lang="en-US" sz="1200" dirty="0">
+                <a:solidFill>
+                  <a:schemeClr val="tx1"/>
+                </a:solidFill>
+              </a:rPr>
+              <a:t> </a:t>
+            </a:r>
+            <a:r>
+              <a:rPr lang="en-US" sz="1200" dirty="0" err="1">
+                <a:solidFill>
+                  <a:schemeClr val="tx1"/>
+                </a:solidFill>
+              </a:rPr>
+              <a:t>Dietista</a:t>
+            </a:r>
+            <a:r>
+              <a:rPr lang="en-US" sz="1200" dirty="0">
+                <a:solidFill>
+                  <a:schemeClr val="tx1"/>
+                </a:solidFill>
+              </a:rPr>
+              <a:t> | All rights reserved!</a:t>
+            </a:r>
+            <a:endParaRPr lang="pt-BR" sz="1200" dirty="0">
+              <a:solidFill>
+                <a:schemeClr val="tx1"/>
+              </a:solidFill>
+            </a:endParaRPr>
           </a:p>
         </p:txBody>
       </p:sp>
@@ -6763,6 +6812,378 @@
           <a:p>
             <a:pPr algn="ctr"/>
             <a:endParaRPr lang="pt-BR"/>
+          </a:p>
+        </p:txBody>
+      </p:sp>
+      <p:grpSp>
+        <p:nvGrpSpPr>
+          <p:cNvPr id="30" name="Grupo 29"/>
+          <p:cNvGrpSpPr/>
+          <p:nvPr/>
+        </p:nvGrpSpPr>
+        <p:grpSpPr>
+          <a:xfrm>
+            <a:off x="1029731" y="4712043"/>
+            <a:ext cx="5285442" cy="1145059"/>
+            <a:chOff x="1481831" y="3519498"/>
+            <a:chExt cx="5133154" cy="1696911"/>
+          </a:xfrm>
+        </p:grpSpPr>
+        <p:pic>
+          <p:nvPicPr>
+            <p:cNvPr id="10" name="Imagem 9"/>
+            <p:cNvPicPr>
+              <a:picLocks noChangeAspect="1"/>
+            </p:cNvPicPr>
+            <p:nvPr/>
+          </p:nvPicPr>
+          <p:blipFill>
+            <a:blip r:embed="rId2"/>
+            <a:stretch>
+              <a:fillRect/>
+            </a:stretch>
+          </p:blipFill>
+          <p:spPr>
+            <a:xfrm>
+              <a:off x="1724612" y="3611858"/>
+              <a:ext cx="516667" cy="434580"/>
+            </a:xfrm>
+            <a:prstGeom prst="rect">
+              <a:avLst/>
+            </a:prstGeom>
+          </p:spPr>
+        </p:pic>
+        <p:sp>
+          <p:nvSpPr>
+            <p:cNvPr id="18" name="CaixaDeTexto 17"/>
+            <p:cNvSpPr txBox="1"/>
+            <p:nvPr/>
+          </p:nvSpPr>
+          <p:spPr>
+            <a:xfrm>
+              <a:off x="1481831" y="4160768"/>
+              <a:ext cx="886547" cy="984885"/>
+            </a:xfrm>
+            <a:prstGeom prst="rect">
+              <a:avLst/>
+            </a:prstGeom>
+            <a:noFill/>
+          </p:spPr>
+          <p:txBody>
+            <a:bodyPr wrap="square" rtlCol="0">
+              <a:spAutoFit/>
+            </a:bodyPr>
+            <a:lstStyle/>
+            <a:p>
+              <a:r>
+                <a:rPr lang="pt-BR" sz="1400" b="1" dirty="0" smtClean="0"/>
+                <a:t>Endereço</a:t>
+              </a:r>
+            </a:p>
+            <a:p>
+              <a:r>
+                <a:rPr lang="pt-BR" sz="1000" dirty="0" smtClean="0"/>
+                <a:t>Av. Pres. Vargas, 359 2° andar</a:t>
+              </a:r>
+              <a:endParaRPr lang="pt-BR" sz="1000" b="1" dirty="0" smtClean="0"/>
+            </a:p>
+            <a:p>
+              <a:endParaRPr lang="pt-BR" sz="1400" b="1" dirty="0"/>
+            </a:p>
+          </p:txBody>
+        </p:sp>
+        <p:sp>
+          <p:nvSpPr>
+            <p:cNvPr id="24" name="CaixaDeTexto 23"/>
+            <p:cNvSpPr txBox="1"/>
+            <p:nvPr/>
+          </p:nvSpPr>
+          <p:spPr>
+            <a:xfrm>
+              <a:off x="2692792" y="4167975"/>
+              <a:ext cx="1233282" cy="615553"/>
+            </a:xfrm>
+            <a:prstGeom prst="rect">
+              <a:avLst/>
+            </a:prstGeom>
+            <a:noFill/>
+          </p:spPr>
+          <p:txBody>
+            <a:bodyPr wrap="square" rtlCol="0">
+              <a:spAutoFit/>
+            </a:bodyPr>
+            <a:lstStyle/>
+            <a:p>
+              <a:r>
+                <a:rPr lang="pt-BR" sz="1400" b="1" dirty="0" smtClean="0"/>
+                <a:t>Telefone</a:t>
+              </a:r>
+            </a:p>
+            <a:p>
+              <a:r>
+                <a:rPr lang="pt-BR" sz="1000" dirty="0" smtClean="0"/>
+                <a:t>+55 21 3335-7489</a:t>
+              </a:r>
+              <a:r>
+                <a:rPr lang="pt-BR" sz="1000" dirty="0"/>
+                <a:t/>
+              </a:r>
+              <a:br>
+                <a:rPr lang="pt-BR" sz="1000" dirty="0"/>
+              </a:br>
+              <a:r>
+                <a:rPr lang="pt-BR" sz="1000" dirty="0" smtClean="0"/>
+                <a:t>+55 21 99836277</a:t>
+              </a:r>
+              <a:endParaRPr lang="pt-BR" sz="1000" b="1" dirty="0"/>
+            </a:p>
+          </p:txBody>
+        </p:sp>
+        <p:pic>
+          <p:nvPicPr>
+            <p:cNvPr id="25" name="Imagem 24"/>
+            <p:cNvPicPr>
+              <a:picLocks noChangeAspect="1"/>
+            </p:cNvPicPr>
+            <p:nvPr/>
+          </p:nvPicPr>
+          <p:blipFill>
+            <a:blip r:embed="rId3"/>
+            <a:stretch>
+              <a:fillRect/>
+            </a:stretch>
+          </p:blipFill>
+          <p:spPr>
+            <a:xfrm>
+              <a:off x="2985607" y="3565184"/>
+              <a:ext cx="573170" cy="523329"/>
+            </a:xfrm>
+            <a:prstGeom prst="rect">
+              <a:avLst/>
+            </a:prstGeom>
+          </p:spPr>
+        </p:pic>
+        <p:pic>
+          <p:nvPicPr>
+            <p:cNvPr id="26" name="Imagem 25"/>
+            <p:cNvPicPr>
+              <a:picLocks noChangeAspect="1"/>
+            </p:cNvPicPr>
+            <p:nvPr/>
+          </p:nvPicPr>
+          <p:blipFill>
+            <a:blip r:embed="rId4"/>
+            <a:stretch>
+              <a:fillRect/>
+            </a:stretch>
+          </p:blipFill>
+          <p:spPr>
+            <a:xfrm>
+              <a:off x="4306678" y="3552774"/>
+              <a:ext cx="653120" cy="524900"/>
+            </a:xfrm>
+            <a:prstGeom prst="rect">
+              <a:avLst/>
+            </a:prstGeom>
+          </p:spPr>
+        </p:pic>
+        <p:sp>
+          <p:nvSpPr>
+            <p:cNvPr id="27" name="CaixaDeTexto 26"/>
+            <p:cNvSpPr txBox="1"/>
+            <p:nvPr/>
+          </p:nvSpPr>
+          <p:spPr>
+            <a:xfrm>
+              <a:off x="4215381" y="4156319"/>
+              <a:ext cx="1373756" cy="461665"/>
+            </a:xfrm>
+            <a:prstGeom prst="rect">
+              <a:avLst/>
+            </a:prstGeom>
+            <a:noFill/>
+          </p:spPr>
+          <p:txBody>
+            <a:bodyPr wrap="square" rtlCol="0">
+              <a:spAutoFit/>
+            </a:bodyPr>
+            <a:lstStyle/>
+            <a:p>
+              <a:r>
+                <a:rPr lang="pt-BR" sz="1400" b="1" dirty="0" smtClean="0"/>
+                <a:t>E-mail</a:t>
+              </a:r>
+            </a:p>
+            <a:p>
+              <a:r>
+                <a:rPr lang="pt-BR" sz="1000" dirty="0"/>
+                <a:t>nutrivalfg@gmail.com</a:t>
+              </a:r>
+              <a:endParaRPr lang="pt-BR" sz="1000" b="1" dirty="0"/>
+            </a:p>
+          </p:txBody>
+        </p:sp>
+        <p:pic>
+          <p:nvPicPr>
+            <p:cNvPr id="28" name="Imagem 27"/>
+            <p:cNvPicPr>
+              <a:picLocks noChangeAspect="1"/>
+            </p:cNvPicPr>
+            <p:nvPr/>
+          </p:nvPicPr>
+          <p:blipFill>
+            <a:blip r:embed="rId5"/>
+            <a:stretch>
+              <a:fillRect/>
+            </a:stretch>
+          </p:blipFill>
+          <p:spPr>
+            <a:xfrm>
+              <a:off x="5704126" y="3519498"/>
+              <a:ext cx="633164" cy="619693"/>
+            </a:xfrm>
+            <a:prstGeom prst="rect">
+              <a:avLst/>
+            </a:prstGeom>
+          </p:spPr>
+        </p:pic>
+        <p:sp>
+          <p:nvSpPr>
+            <p:cNvPr id="29" name="CaixaDeTexto 28"/>
+            <p:cNvSpPr txBox="1"/>
+            <p:nvPr/>
+          </p:nvSpPr>
+          <p:spPr>
+            <a:xfrm>
+              <a:off x="5589137" y="4139191"/>
+              <a:ext cx="1025848" cy="1077218"/>
+            </a:xfrm>
+            <a:prstGeom prst="rect">
+              <a:avLst/>
+            </a:prstGeom>
+            <a:noFill/>
+          </p:spPr>
+          <p:txBody>
+            <a:bodyPr wrap="square" rtlCol="0">
+              <a:spAutoFit/>
+            </a:bodyPr>
+            <a:lstStyle/>
+            <a:p>
+              <a:r>
+                <a:rPr lang="pt-BR" sz="1400" b="1" dirty="0" smtClean="0"/>
+                <a:t>Horário</a:t>
+              </a:r>
+            </a:p>
+            <a:p>
+              <a:r>
+                <a:rPr lang="es-ES" sz="1000" dirty="0" smtClean="0"/>
+                <a:t>Segunda a Sexta: </a:t>
+              </a:r>
+            </a:p>
+            <a:p>
+              <a:r>
+                <a:rPr lang="es-ES" sz="1000" dirty="0" smtClean="0"/>
+                <a:t>9:00 – 18:00</a:t>
+              </a:r>
+              <a:r>
+                <a:rPr lang="es-ES" sz="1000" dirty="0"/>
+                <a:t/>
+              </a:r>
+              <a:br>
+                <a:rPr lang="es-ES" sz="1000" dirty="0"/>
+              </a:br>
+              <a:r>
+                <a:rPr lang="es-ES" sz="1000" dirty="0"/>
+                <a:t>Sábados de 10:00 - 14:00.</a:t>
+              </a:r>
+              <a:endParaRPr lang="pt-BR" sz="1000" b="1" dirty="0"/>
+            </a:p>
+          </p:txBody>
+        </p:sp>
+      </p:grpSp>
+      <p:pic>
+        <p:nvPicPr>
+          <p:cNvPr id="31" name="Imagem 30"/>
+          <p:cNvPicPr>
+            <a:picLocks noChangeAspect="1"/>
+          </p:cNvPicPr>
+          <p:nvPr/>
+        </p:nvPicPr>
+        <p:blipFill>
+          <a:blip r:embed="rId6"/>
+          <a:stretch>
+            <a:fillRect/>
+          </a:stretch>
+        </p:blipFill>
+        <p:spPr>
+          <a:xfrm>
+            <a:off x="2062200" y="2519475"/>
+            <a:ext cx="2968576" cy="1871150"/>
+          </a:xfrm>
+          <a:prstGeom prst="rect">
+            <a:avLst/>
+          </a:prstGeom>
+        </p:spPr>
+      </p:pic>
+      <p:sp>
+        <p:nvSpPr>
+          <p:cNvPr id="32" name="Retângulo de cantos arredondados 31"/>
+          <p:cNvSpPr/>
+          <p:nvPr/>
+        </p:nvSpPr>
+        <p:spPr>
+          <a:xfrm>
+            <a:off x="2379720" y="3650113"/>
+            <a:ext cx="1871004" cy="260803"/>
+          </a:xfrm>
+          <a:prstGeom prst="roundRect">
+            <a:avLst/>
+          </a:prstGeom>
+          <a:solidFill>
+            <a:schemeClr val="bg1"/>
+          </a:solidFill>
+          <a:scene3d>
+            <a:camera prst="orthographicFront"/>
+            <a:lightRig rig="threePt" dir="t"/>
+          </a:scene3d>
+          <a:sp3d>
+            <a:bevelT/>
+          </a:sp3d>
+        </p:spPr>
+        <p:style>
+          <a:lnRef idx="2">
+            <a:schemeClr val="accent1">
+              <a:shade val="50000"/>
+            </a:schemeClr>
+          </a:lnRef>
+          <a:fillRef idx="1">
+            <a:schemeClr val="accent1"/>
+          </a:fillRef>
+          <a:effectRef idx="0">
+            <a:schemeClr val="accent1"/>
+          </a:effectRef>
+          <a:fontRef idx="minor">
+            <a:schemeClr val="lt1"/>
+          </a:fontRef>
+        </p:style>
+        <p:txBody>
+          <a:bodyPr rtlCol="0" anchor="ctr"/>
+          <a:lstStyle/>
+          <a:p>
+            <a:pPr algn="ctr"/>
+            <a:r>
+              <a:rPr lang="pt-BR" sz="1200" b="1" dirty="0" smtClean="0">
+                <a:solidFill>
+                  <a:schemeClr val="tx1"/>
+                </a:solidFill>
+              </a:rPr>
+              <a:t>Compartilhar Localização</a:t>
+            </a:r>
+            <a:endParaRPr lang="pt-BR" sz="1200" b="1" dirty="0">
+              <a:solidFill>
+                <a:schemeClr val="tx1"/>
+              </a:solidFill>
+            </a:endParaRPr>
           </a:p>
         </p:txBody>
       </p:sp>

</xml_diff>